<commit_message>
added Supp Fig 6
</commit_message>
<xml_diff>
--- a/draft/SuppFig5.pptx
+++ b/draft/SuppFig5.pptx
@@ -104,6 +104,11 @@
       </a:defRPr>
     </a:lvl9pPr>
   </p:defaultTextStyle>
+  <p:extLst>
+    <p:ext uri="{EFAFB233-063F-42B5-8137-9DF3F51BA10A}">
+      <p15:sldGuideLst xmlns:p15="http://schemas.microsoft.com/office/powerpoint/2012/main"/>
+    </p:ext>
+  </p:extLst>
 </p:presentation>
 </file>
 
@@ -254,7 +259,7 @@
           <a:p>
             <a:fld id="{219B9D77-B7F6-2241-94EB-4EB1C7700FC0}" type="datetimeFigureOut">
               <a:rPr lang="en-US" smtClean="0"/>
-              <a:t>7/29/18</a:t>
+              <a:t>8/1/18</a:t>
             </a:fld>
             <a:endParaRPr lang="en-US"/>
           </a:p>
@@ -452,7 +457,7 @@
           <a:p>
             <a:fld id="{219B9D77-B7F6-2241-94EB-4EB1C7700FC0}" type="datetimeFigureOut">
               <a:rPr lang="en-US" smtClean="0"/>
-              <a:t>7/29/18</a:t>
+              <a:t>8/1/18</a:t>
             </a:fld>
             <a:endParaRPr lang="en-US"/>
           </a:p>
@@ -660,7 +665,7 @@
           <a:p>
             <a:fld id="{219B9D77-B7F6-2241-94EB-4EB1C7700FC0}" type="datetimeFigureOut">
               <a:rPr lang="en-US" smtClean="0"/>
-              <a:t>7/29/18</a:t>
+              <a:t>8/1/18</a:t>
             </a:fld>
             <a:endParaRPr lang="en-US"/>
           </a:p>
@@ -858,7 +863,7 @@
           <a:p>
             <a:fld id="{219B9D77-B7F6-2241-94EB-4EB1C7700FC0}" type="datetimeFigureOut">
               <a:rPr lang="en-US" smtClean="0"/>
-              <a:t>7/29/18</a:t>
+              <a:t>8/1/18</a:t>
             </a:fld>
             <a:endParaRPr lang="en-US"/>
           </a:p>
@@ -1133,7 +1138,7 @@
           <a:p>
             <a:fld id="{219B9D77-B7F6-2241-94EB-4EB1C7700FC0}" type="datetimeFigureOut">
               <a:rPr lang="en-US" smtClean="0"/>
-              <a:t>7/29/18</a:t>
+              <a:t>8/1/18</a:t>
             </a:fld>
             <a:endParaRPr lang="en-US"/>
           </a:p>
@@ -1398,7 +1403,7 @@
           <a:p>
             <a:fld id="{219B9D77-B7F6-2241-94EB-4EB1C7700FC0}" type="datetimeFigureOut">
               <a:rPr lang="en-US" smtClean="0"/>
-              <a:t>7/29/18</a:t>
+              <a:t>8/1/18</a:t>
             </a:fld>
             <a:endParaRPr lang="en-US"/>
           </a:p>
@@ -1810,7 +1815,7 @@
           <a:p>
             <a:fld id="{219B9D77-B7F6-2241-94EB-4EB1C7700FC0}" type="datetimeFigureOut">
               <a:rPr lang="en-US" smtClean="0"/>
-              <a:t>7/29/18</a:t>
+              <a:t>8/1/18</a:t>
             </a:fld>
             <a:endParaRPr lang="en-US"/>
           </a:p>
@@ -1951,7 +1956,7 @@
           <a:p>
             <a:fld id="{219B9D77-B7F6-2241-94EB-4EB1C7700FC0}" type="datetimeFigureOut">
               <a:rPr lang="en-US" smtClean="0"/>
-              <a:t>7/29/18</a:t>
+              <a:t>8/1/18</a:t>
             </a:fld>
             <a:endParaRPr lang="en-US"/>
           </a:p>
@@ -2064,7 +2069,7 @@
           <a:p>
             <a:fld id="{219B9D77-B7F6-2241-94EB-4EB1C7700FC0}" type="datetimeFigureOut">
               <a:rPr lang="en-US" smtClean="0"/>
-              <a:t>7/29/18</a:t>
+              <a:t>8/1/18</a:t>
             </a:fld>
             <a:endParaRPr lang="en-US"/>
           </a:p>
@@ -2375,7 +2380,7 @@
           <a:p>
             <a:fld id="{219B9D77-B7F6-2241-94EB-4EB1C7700FC0}" type="datetimeFigureOut">
               <a:rPr lang="en-US" smtClean="0"/>
-              <a:t>7/29/18</a:t>
+              <a:t>8/1/18</a:t>
             </a:fld>
             <a:endParaRPr lang="en-US"/>
           </a:p>
@@ -2663,7 +2668,7 @@
           <a:p>
             <a:fld id="{219B9D77-B7F6-2241-94EB-4EB1C7700FC0}" type="datetimeFigureOut">
               <a:rPr lang="en-US" smtClean="0"/>
-              <a:t>7/29/18</a:t>
+              <a:t>8/1/18</a:t>
             </a:fld>
             <a:endParaRPr lang="en-US"/>
           </a:p>
@@ -2904,7 +2909,7 @@
           <a:p>
             <a:fld id="{219B9D77-B7F6-2241-94EB-4EB1C7700FC0}" type="datetimeFigureOut">
               <a:rPr lang="en-US" smtClean="0"/>
-              <a:t>7/29/18</a:t>
+              <a:t>8/1/18</a:t>
             </a:fld>
             <a:endParaRPr lang="en-US"/>
           </a:p>
@@ -3342,7 +3347,7 @@
             <a:avLst/>
           </a:prstGeom>
           <a:solidFill>
-            <a:srgbClr val="1E8369"/>
+            <a:schemeClr val="tx1"/>
           </a:solidFill>
           <a:ln>
             <a:noFill/>
@@ -3692,14 +3697,14 @@
         </p:nvSpPr>
         <p:spPr>
           <a:xfrm>
-            <a:off x="1062311" y="118534"/>
+            <a:off x="1062311" y="25770"/>
             <a:ext cx="9889366" cy="2054346"/>
           </a:xfrm>
           <a:prstGeom prst="rect">
             <a:avLst/>
           </a:prstGeom>
           <a:solidFill>
-            <a:srgbClr val="8296B0"/>
+            <a:schemeClr val="tx1"/>
           </a:solidFill>
           <a:ln>
             <a:noFill/>
@@ -4000,7 +4005,7 @@
         </p:nvSpPr>
         <p:spPr>
           <a:xfrm>
-            <a:off x="1062311" y="2226624"/>
+            <a:off x="1062311" y="2266380"/>
             <a:ext cx="9798832" cy="57388"/>
           </a:xfrm>
           <a:prstGeom prst="rect">
@@ -4068,7 +4073,7 @@
         </p:nvSpPr>
         <p:spPr>
           <a:xfrm rot="-5400000">
-            <a:off x="910347" y="2359672"/>
+            <a:off x="910347" y="2452436"/>
             <a:ext cx="704039" cy="400110"/>
           </a:xfrm>
           <a:prstGeom prst="rect">
@@ -4134,7 +4139,7 @@
         </p:nvSpPr>
         <p:spPr>
           <a:xfrm rot="-5400000">
-            <a:off x="1550362" y="2358806"/>
+            <a:off x="1550362" y="2451570"/>
             <a:ext cx="704039" cy="400110"/>
           </a:xfrm>
           <a:prstGeom prst="rect">
@@ -4200,7 +4205,7 @@
         </p:nvSpPr>
         <p:spPr>
           <a:xfrm rot="-5400000">
-            <a:off x="2190378" y="2351870"/>
+            <a:off x="2190378" y="2444634"/>
             <a:ext cx="704039" cy="400110"/>
           </a:xfrm>
           <a:prstGeom prst="rect">
@@ -4266,7 +4271,7 @@
         </p:nvSpPr>
         <p:spPr>
           <a:xfrm rot="-5400000">
-            <a:off x="2818259" y="2378589"/>
+            <a:off x="2818259" y="2471353"/>
             <a:ext cx="704039" cy="400110"/>
           </a:xfrm>
           <a:prstGeom prst="rect">
@@ -4332,7 +4337,7 @@
         </p:nvSpPr>
         <p:spPr>
           <a:xfrm rot="-5400000">
-            <a:off x="3444734" y="2361656"/>
+            <a:off x="3444734" y="2454420"/>
             <a:ext cx="704039" cy="400110"/>
           </a:xfrm>
           <a:prstGeom prst="rect">
@@ -4398,7 +4403,7 @@
         </p:nvSpPr>
         <p:spPr>
           <a:xfrm rot="-5400000">
-            <a:off x="4071385" y="2361656"/>
+            <a:off x="4071385" y="2454420"/>
             <a:ext cx="704039" cy="400110"/>
           </a:xfrm>
           <a:prstGeom prst="rect">
@@ -4464,7 +4469,7 @@
         </p:nvSpPr>
         <p:spPr>
           <a:xfrm rot="-5400000">
-            <a:off x="4700498" y="2349115"/>
+            <a:off x="4700498" y="2441879"/>
             <a:ext cx="704039" cy="400110"/>
           </a:xfrm>
           <a:prstGeom prst="rect">
@@ -4530,7 +4535,7 @@
         </p:nvSpPr>
         <p:spPr>
           <a:xfrm rot="-5400000">
-            <a:off x="5338292" y="2361656"/>
+            <a:off x="5338292" y="2454420"/>
             <a:ext cx="704039" cy="400110"/>
           </a:xfrm>
           <a:prstGeom prst="rect">
@@ -4596,7 +4601,7 @@
         </p:nvSpPr>
         <p:spPr>
           <a:xfrm rot="-5400000">
-            <a:off x="5972928" y="2360790"/>
+            <a:off x="5972928" y="2453554"/>
             <a:ext cx="704039" cy="400110"/>
           </a:xfrm>
           <a:prstGeom prst="rect">
@@ -4662,7 +4667,7 @@
         </p:nvSpPr>
         <p:spPr>
           <a:xfrm rot="-5400000">
-            <a:off x="6610723" y="2368246"/>
+            <a:off x="6610723" y="2461010"/>
             <a:ext cx="704039" cy="400110"/>
           </a:xfrm>
           <a:prstGeom prst="rect">
@@ -4728,7 +4733,7 @@
         </p:nvSpPr>
         <p:spPr>
           <a:xfrm rot="-5400000">
-            <a:off x="7242203" y="2351312"/>
+            <a:off x="7242203" y="2444076"/>
             <a:ext cx="704039" cy="400110"/>
           </a:xfrm>
           <a:prstGeom prst="rect">
@@ -4794,7 +4799,7 @@
         </p:nvSpPr>
         <p:spPr>
           <a:xfrm rot="-5400000">
-            <a:off x="7873682" y="2351313"/>
+            <a:off x="7873682" y="2444077"/>
             <a:ext cx="704039" cy="400110"/>
           </a:xfrm>
           <a:prstGeom prst="rect">
@@ -4860,7 +4865,7 @@
         </p:nvSpPr>
         <p:spPr>
           <a:xfrm rot="-5400000">
-            <a:off x="8505162" y="2363851"/>
+            <a:off x="8505162" y="2456615"/>
             <a:ext cx="704039" cy="400110"/>
           </a:xfrm>
           <a:prstGeom prst="rect">
@@ -4926,7 +4931,7 @@
         </p:nvSpPr>
         <p:spPr>
           <a:xfrm rot="-5400000">
-            <a:off x="9136642" y="2368246"/>
+            <a:off x="9136642" y="2461010"/>
             <a:ext cx="704039" cy="400110"/>
           </a:xfrm>
           <a:prstGeom prst="rect">
@@ -4992,7 +4997,7 @@
         </p:nvSpPr>
         <p:spPr>
           <a:xfrm rot="-5400000">
-            <a:off x="9768122" y="2349115"/>
+            <a:off x="9768122" y="2441879"/>
             <a:ext cx="704039" cy="400110"/>
           </a:xfrm>
           <a:prstGeom prst="rect">
@@ -5058,7 +5063,7 @@
         </p:nvSpPr>
         <p:spPr>
           <a:xfrm rot="-5400000">
-            <a:off x="10399602" y="2363851"/>
+            <a:off x="10399602" y="2456615"/>
             <a:ext cx="704039" cy="400110"/>
           </a:xfrm>
           <a:prstGeom prst="rect">
@@ -5131,9 +5136,7 @@
             <a:avLst/>
           </a:prstGeom>
           <a:solidFill>
-            <a:schemeClr val="bg1">
-              <a:lumMod val="50000"/>
-            </a:schemeClr>
+            <a:schemeClr val="tx1"/>
           </a:solidFill>
           <a:ln>
             <a:noFill/>

</xml_diff>